<commit_message>
intro to econ of crime
</commit_message>
<xml_diff>
--- a/slides/Slides/EconomicsofCrime.pptx
+++ b/slides/Slides/EconomicsofCrime.pptx
@@ -591,7 +591,7 @@
           <a:p>
             <a:fld id="{4BDF68E2-58F2-4D09-BE8B-E3BD06533059}" type="datetimeFigureOut">
               <a:rPr lang="en-US" dirty="0"/>
-              <a:t>10/5/2021</a:t>
+              <a:t>2/13/24</a:t>
             </a:fld>
             <a:endParaRPr lang="en-US" dirty="0"/>
           </a:p>
@@ -794,7 +794,7 @@
           <a:p>
             <a:fld id="{2E2D6473-DF6D-4702-B328-E0DD40540A4E}" type="datetimeFigureOut">
               <a:rPr lang="en-US" dirty="0"/>
-              <a:t>10/5/2021</a:t>
+              <a:t>2/13/24</a:t>
             </a:fld>
             <a:endParaRPr lang="en-US" dirty="0"/>
           </a:p>
@@ -1045,7 +1045,7 @@
           <a:p>
             <a:fld id="{E26F7E3A-B166-407D-9866-32884E7D5B37}" type="datetimeFigureOut">
               <a:rPr lang="en-US" dirty="0"/>
-              <a:t>10/5/2021</a:t>
+              <a:t>2/13/24</a:t>
             </a:fld>
             <a:endParaRPr lang="en-US" dirty="0"/>
           </a:p>
@@ -1214,7 +1214,7 @@
           <a:p>
             <a:fld id="{528FC5F6-F338-4AE4-BB23-26385BCFC423}" type="datetimeFigureOut">
               <a:rPr lang="en-US" dirty="0"/>
-              <a:t>10/5/2021</a:t>
+              <a:t>2/13/24</a:t>
             </a:fld>
             <a:endParaRPr lang="en-US" dirty="0"/>
           </a:p>
@@ -1552,7 +1552,7 @@
           <a:p>
             <a:fld id="{20EBB0C4-6273-4C6E-B9BD-2EDC30F1CD52}" type="datetimeFigureOut">
               <a:rPr lang="en-US" dirty="0"/>
-              <a:t>10/5/2021</a:t>
+              <a:t>2/13/24</a:t>
             </a:fld>
             <a:endParaRPr lang="en-US" dirty="0"/>
           </a:p>
@@ -1822,7 +1822,7 @@
           <a:p>
             <a:fld id="{19AB4D41-86C1-4908-B66A-0B50CEB3BF29}" type="datetimeFigureOut">
               <a:rPr lang="en-US" dirty="0"/>
-              <a:t>10/5/2021</a:t>
+              <a:t>2/13/24</a:t>
             </a:fld>
             <a:endParaRPr lang="en-US" dirty="0"/>
           </a:p>
@@ -2196,7 +2196,7 @@
           <a:p>
             <a:fld id="{E6426E2C-56C1-4E0D-A793-0088A7FDD37E}" type="datetimeFigureOut">
               <a:rPr lang="en-US" dirty="0"/>
-              <a:t>10/5/2021</a:t>
+              <a:t>2/13/24</a:t>
             </a:fld>
             <a:endParaRPr lang="en-US" dirty="0"/>
           </a:p>
@@ -2309,7 +2309,7 @@
           <a:p>
             <a:fld id="{C8C39B41-D8B5-4052-B551-9B5525EAA8B6}" type="datetimeFigureOut">
               <a:rPr lang="en-US" dirty="0"/>
-              <a:t>10/5/2021</a:t>
+              <a:t>2/13/24</a:t>
             </a:fld>
             <a:endParaRPr lang="en-US" dirty="0"/>
           </a:p>
@@ -2475,7 +2475,7 @@
           <a:p>
             <a:fld id="{4D94136C-8742-45B2-AF27-D93DF72833A9}" type="datetimeFigureOut">
               <a:rPr lang="en-US" dirty="0"/>
-              <a:t>10/5/2021</a:t>
+              <a:t>2/13/24</a:t>
             </a:fld>
             <a:endParaRPr lang="en-US" dirty="0"/>
           </a:p>
@@ -2825,7 +2825,7 @@
           <a:p>
             <a:fld id="{32ABBEA6-7C60-4B02-AE87-00D78D8422AF}" type="datetimeFigureOut">
               <a:rPr lang="en-US" dirty="0"/>
-              <a:t>10/5/2021</a:t>
+              <a:t>2/13/24</a:t>
             </a:fld>
             <a:endParaRPr lang="en-US" dirty="0"/>
           </a:p>
@@ -3203,7 +3203,7 @@
           <a:p>
             <a:fld id="{C9CAD897-D46E-4AD2-BD9B-49DD3E640873}" type="datetimeFigureOut">
               <a:rPr lang="en-US" dirty="0"/>
-              <a:t>10/5/2021</a:t>
+              <a:t>2/13/24</a:t>
             </a:fld>
             <a:endParaRPr lang="en-US" dirty="0"/>
           </a:p>
@@ -3485,7 +3485,7 @@
           <a:p>
             <a:fld id="{98624D31-43A5-475A-80CF-332C9F6DCF35}" type="datetimeFigureOut">
               <a:rPr lang="en-US" dirty="0"/>
-              <a:t>10/5/2021</a:t>
+              <a:t>2/13/24</a:t>
             </a:fld>
             <a:endParaRPr lang="en-US" dirty="0"/>
           </a:p>
@@ -4064,15 +4064,7 @@
           <a:p>
             <a:r>
               <a:rPr lang="en-US" dirty="0"/>
-              <a:t>Professor </a:t>
-            </a:r>
-            <a:r>
-              <a:rPr lang="en-US" dirty="0" err="1"/>
-              <a:t>patrick</a:t>
-            </a:r>
-            <a:r>
-              <a:rPr lang="en-US"/>
-              <a:t> button</a:t>
+              <a:t>Professor Hussain Hadah</a:t>
             </a:r>
           </a:p>
         </p:txBody>

</xml_diff>